<commit_message>
Updated blow pop price
</commit_message>
<xml_diff>
--- a/Assets/Menu/Menu.pptx
+++ b/Assets/Menu/Menu.pptx
@@ -11549,7 +11549,7 @@
                 <a:cs typeface="Calibri"/>
                 <a:sym typeface="Calibri"/>
               </a:rPr>
-              <a:t>Blow Pop</a:t>
+              <a:t>Airheads</a:t>
             </a:r>
           </a:p>
           <a:p>
@@ -11560,7 +11560,7 @@
                 <a:cs typeface="Calibri"/>
                 <a:sym typeface="Calibri"/>
               </a:rPr>
-              <a:t>Airheads</a:t>
+              <a:t>Blow Pop</a:t>
             </a:r>
           </a:p>
           <a:p>
@@ -12246,7 +12246,7 @@
                 <a:cs typeface="Calibri"/>
                 <a:sym typeface="Calibri"/>
               </a:rPr>
-              <a:t>$1.00</a:t>
+              <a:t>$0.50</a:t>
             </a:r>
           </a:p>
           <a:p>

</xml_diff>